<commit_message>
tdf#151891 PPTX import: fix regression of connector position
If the connector shape is connected to the glue point which there
is inside the bounding box, then the position of connector appear
incorrectly, for example different direction of the arrow head.

Regression likely from commit f1d7199864b71031d9de0af04ab456df9c6e4184
"tdf#89449 PPTX import: fix line connectors", as tdf#148926.

Follow-up to commit 7951810fef18357269c59f1e6d7aedd111e71374
"tdf#148926 tdf#151678 PPTX import: position of standard connector
 - part1".

Change-Id: I5671bc70e663a979c43bad1b786118a6a9e92972
Reviewed-on: https://gerrit.libreoffice.org/c/core/+/142293
Reviewed-by: László Németh <nemeth@numbertext.org>
Tested-by: László Németh <nemeth@numbertext.org>
</commit_message>
<xml_diff>
--- a/sd/qa/unit/data/pptx/connectors.pptx
+++ b/sd/qa/unit/data/pptx/connectors.pptx
@@ -764,7 +764,7 @@
         </p:nvSpPr>
         <p:spPr>
           <a:xfrm>
-            <a:off x="4313380" y="3203065"/>
+            <a:off x="2555742" y="1836736"/>
             <a:ext cx="720000" cy="720000"/>
           </a:xfrm>
           <a:prstGeom prst="rect">
@@ -810,7 +810,7 @@
         </p:nvCxnSpPr>
         <p:spPr>
           <a:xfrm rot="16200000" flipV="1">
-            <a:off x="3466425" y="1996109"/>
+            <a:off x="1708787" y="629780"/>
             <a:ext cx="840410" cy="1573501"/>
           </a:xfrm>
           <a:prstGeom prst="bentConnector2">
@@ -852,7 +852,7 @@
         </p:nvCxnSpPr>
         <p:spPr>
           <a:xfrm rot="10800000" flipV="1">
-            <a:off x="4673381" y="2362653"/>
+            <a:off x="2915743" y="996324"/>
             <a:ext cx="1422619" cy="840411"/>
           </a:xfrm>
           <a:prstGeom prst="bentConnector2">
@@ -894,7 +894,7 @@
         </p:nvCxnSpPr>
         <p:spPr>
           <a:xfrm rot="16200000" flipH="1">
-            <a:off x="3140421" y="2390105"/>
+            <a:off x="1382783" y="1023776"/>
             <a:ext cx="1200413" cy="1145505"/>
           </a:xfrm>
           <a:prstGeom prst="bentConnector2">
@@ -936,7 +936,7 @@
         </p:nvCxnSpPr>
         <p:spPr>
           <a:xfrm flipV="1">
-            <a:off x="5033380" y="2362650"/>
+            <a:off x="3275742" y="996321"/>
             <a:ext cx="1062620" cy="1200415"/>
           </a:xfrm>
           <a:prstGeom prst="bentConnector2">
@@ -977,7 +977,7 @@
         </p:nvCxnSpPr>
         <p:spPr>
           <a:xfrm rot="16200000" flipV="1">
-            <a:off x="8475901" y="3218036"/>
+            <a:off x="8272701" y="1946860"/>
             <a:ext cx="890081" cy="976871"/>
           </a:xfrm>
           <a:prstGeom prst="bentConnector2">
@@ -1018,7 +1018,7 @@
         </p:nvCxnSpPr>
         <p:spPr>
           <a:xfrm rot="10800000">
-            <a:off x="8432180" y="3334388"/>
+            <a:off x="8228980" y="2063212"/>
             <a:ext cx="977197" cy="817124"/>
           </a:xfrm>
           <a:prstGeom prst="bentConnector2">
@@ -1059,7 +1059,7 @@
         </p:nvCxnSpPr>
         <p:spPr>
           <a:xfrm flipV="1">
-            <a:off x="8420943" y="1952788"/>
+            <a:off x="8217743" y="681612"/>
             <a:ext cx="982233" cy="1155123"/>
           </a:xfrm>
           <a:prstGeom prst="bentConnector2">
@@ -1100,8 +1100,432 @@
         </p:nvCxnSpPr>
         <p:spPr>
           <a:xfrm rot="5400000" flipH="1" flipV="1">
-            <a:off x="8294124" y="2125777"/>
+            <a:off x="8090924" y="854601"/>
             <a:ext cx="1108953" cy="855315"/>
+          </a:xfrm>
+          <a:prstGeom prst="bentConnector2">
+            <a:avLst/>
+          </a:prstGeom>
+          <a:ln>
+            <a:tailEnd type="triangle"/>
+          </a:ln>
+        </p:spPr>
+        <p:style>
+          <a:lnRef idx="1">
+            <a:schemeClr val="accent1"/>
+          </a:lnRef>
+          <a:fillRef idx="0">
+            <a:schemeClr val="accent1"/>
+          </a:fillRef>
+          <a:effectRef idx="0">
+            <a:schemeClr val="accent1"/>
+          </a:effectRef>
+          <a:fontRef idx="minor">
+            <a:schemeClr val="tx1"/>
+          </a:fontRef>
+        </p:style>
+      </p:cxnSp>
+      <p:sp>
+        <p:nvSpPr>
+          <p:cNvPr id="3" name="Isosceles Triangle 2">
+            <a:extLst>
+              <a:ext uri="{FF2B5EF4-FFF2-40B4-BE49-F238E27FC236}">
+                <a16:creationId xmlns:a16="http://schemas.microsoft.com/office/drawing/2014/main" id="{CCBA9FDB-68D2-C646-5E9B-877E261D8FBA}"/>
+              </a:ext>
+            </a:extLst>
+          </p:cNvPr>
+          <p:cNvSpPr/>
+          <p:nvPr/>
+        </p:nvSpPr>
+        <p:spPr>
+          <a:xfrm>
+            <a:off x="2426215" y="4661266"/>
+            <a:ext cx="979054" cy="960582"/>
+          </a:xfrm>
+          <a:prstGeom prst="triangle">
+            <a:avLst/>
+          </a:prstGeom>
+        </p:spPr>
+        <p:style>
+          <a:lnRef idx="2">
+            <a:schemeClr val="dk1"/>
+          </a:lnRef>
+          <a:fillRef idx="1">
+            <a:schemeClr val="lt1"/>
+          </a:fillRef>
+          <a:effectRef idx="0">
+            <a:schemeClr val="dk1"/>
+          </a:effectRef>
+          <a:fontRef idx="minor">
+            <a:schemeClr val="dk1"/>
+          </a:fontRef>
+        </p:style>
+        <p:txBody>
+          <a:bodyPr rtlCol="0" anchor="ctr"/>
+          <a:lstStyle/>
+          <a:p>
+            <a:pPr algn="ctr"/>
+            <a:endParaRPr lang="en-US"/>
+          </a:p>
+        </p:txBody>
+      </p:sp>
+      <p:cxnSp>
+        <p:nvCxnSpPr>
+          <p:cNvPr id="7" name="Connector: Elbow 6">
+            <a:extLst>
+              <a:ext uri="{FF2B5EF4-FFF2-40B4-BE49-F238E27FC236}">
+                <a16:creationId xmlns:a16="http://schemas.microsoft.com/office/drawing/2014/main" id="{7E8AB22D-E828-0D4D-B41C-265F5B2F3D24}"/>
+              </a:ext>
+            </a:extLst>
+          </p:cNvPr>
+          <p:cNvCxnSpPr>
+            <a:cxnSpLocks/>
+            <a:endCxn id="3" idx="5"/>
+          </p:cNvCxnSpPr>
+          <p:nvPr/>
+        </p:nvCxnSpPr>
+        <p:spPr>
+          <a:xfrm rot="5400000">
+            <a:off x="2740967" y="4040196"/>
+            <a:ext cx="1520901" cy="681821"/>
+          </a:xfrm>
+          <a:prstGeom prst="bentConnector2">
+            <a:avLst/>
+          </a:prstGeom>
+          <a:ln>
+            <a:tailEnd type="triangle"/>
+          </a:ln>
+        </p:spPr>
+        <p:style>
+          <a:lnRef idx="1">
+            <a:schemeClr val="accent1"/>
+          </a:lnRef>
+          <a:fillRef idx="0">
+            <a:schemeClr val="accent1"/>
+          </a:fillRef>
+          <a:effectRef idx="0">
+            <a:schemeClr val="accent1"/>
+          </a:effectRef>
+          <a:fontRef idx="minor">
+            <a:schemeClr val="tx1"/>
+          </a:fontRef>
+        </p:style>
+      </p:cxnSp>
+      <p:cxnSp>
+        <p:nvCxnSpPr>
+          <p:cNvPr id="10" name="Connector: Elbow 9">
+            <a:extLst>
+              <a:ext uri="{FF2B5EF4-FFF2-40B4-BE49-F238E27FC236}">
+                <a16:creationId xmlns:a16="http://schemas.microsoft.com/office/drawing/2014/main" id="{D99FF07C-8031-5182-C714-9D0DE5F16F7B}"/>
+              </a:ext>
+            </a:extLst>
+          </p:cNvPr>
+          <p:cNvCxnSpPr>
+            <a:cxnSpLocks/>
+            <a:stCxn id="3" idx="5"/>
+          </p:cNvCxnSpPr>
+          <p:nvPr/>
+        </p:nvCxnSpPr>
+        <p:spPr>
+          <a:xfrm>
+            <a:off x="3160506" y="5141557"/>
+            <a:ext cx="1177856" cy="1471679"/>
+          </a:xfrm>
+          <a:prstGeom prst="bentConnector2">
+            <a:avLst/>
+          </a:prstGeom>
+          <a:ln>
+            <a:tailEnd type="triangle"/>
+          </a:ln>
+        </p:spPr>
+        <p:style>
+          <a:lnRef idx="1">
+            <a:schemeClr val="accent1"/>
+          </a:lnRef>
+          <a:fillRef idx="0">
+            <a:schemeClr val="accent1"/>
+          </a:fillRef>
+          <a:effectRef idx="0">
+            <a:schemeClr val="accent1"/>
+          </a:effectRef>
+          <a:fontRef idx="minor">
+            <a:schemeClr val="tx1"/>
+          </a:fontRef>
+        </p:style>
+      </p:cxnSp>
+      <p:cxnSp>
+        <p:nvCxnSpPr>
+          <p:cNvPr id="17" name="Connector: Elbow 16">
+            <a:extLst>
+              <a:ext uri="{FF2B5EF4-FFF2-40B4-BE49-F238E27FC236}">
+                <a16:creationId xmlns:a16="http://schemas.microsoft.com/office/drawing/2014/main" id="{83880CA4-B238-B328-D6A5-594A68AEA128}"/>
+              </a:ext>
+            </a:extLst>
+          </p:cNvPr>
+          <p:cNvCxnSpPr>
+            <a:cxnSpLocks/>
+            <a:endCxn id="3" idx="1"/>
+          </p:cNvCxnSpPr>
+          <p:nvPr/>
+        </p:nvCxnSpPr>
+        <p:spPr>
+          <a:xfrm rot="16200000" flipH="1">
+            <a:off x="1198494" y="3669072"/>
+            <a:ext cx="1520902" cy="1424067"/>
+          </a:xfrm>
+          <a:prstGeom prst="bentConnector2">
+            <a:avLst/>
+          </a:prstGeom>
+          <a:ln>
+            <a:tailEnd type="triangle"/>
+          </a:ln>
+        </p:spPr>
+        <p:style>
+          <a:lnRef idx="1">
+            <a:schemeClr val="accent1"/>
+          </a:lnRef>
+          <a:fillRef idx="0">
+            <a:schemeClr val="accent1"/>
+          </a:fillRef>
+          <a:effectRef idx="0">
+            <a:schemeClr val="accent1"/>
+          </a:effectRef>
+          <a:fontRef idx="minor">
+            <a:schemeClr val="tx1"/>
+          </a:fontRef>
+        </p:style>
+      </p:cxnSp>
+      <p:cxnSp>
+        <p:nvCxnSpPr>
+          <p:cNvPr id="23" name="Connector: Elbow 22">
+            <a:extLst>
+              <a:ext uri="{FF2B5EF4-FFF2-40B4-BE49-F238E27FC236}">
+                <a16:creationId xmlns:a16="http://schemas.microsoft.com/office/drawing/2014/main" id="{7FC72DE7-599C-AA72-3CCB-ACEF754113A8}"/>
+              </a:ext>
+            </a:extLst>
+          </p:cNvPr>
+          <p:cNvCxnSpPr>
+            <a:cxnSpLocks/>
+            <a:stCxn id="3" idx="1"/>
+          </p:cNvCxnSpPr>
+          <p:nvPr/>
+        </p:nvCxnSpPr>
+        <p:spPr>
+          <a:xfrm rot="10800000" flipV="1">
+            <a:off x="1662545" y="5141557"/>
+            <a:ext cx="1008434" cy="1545570"/>
+          </a:xfrm>
+          <a:prstGeom prst="bentConnector2">
+            <a:avLst/>
+          </a:prstGeom>
+          <a:ln>
+            <a:tailEnd type="triangle"/>
+          </a:ln>
+        </p:spPr>
+        <p:style>
+          <a:lnRef idx="1">
+            <a:schemeClr val="accent1"/>
+          </a:lnRef>
+          <a:fillRef idx="0">
+            <a:schemeClr val="accent1"/>
+          </a:fillRef>
+          <a:effectRef idx="0">
+            <a:schemeClr val="accent1"/>
+          </a:effectRef>
+          <a:fontRef idx="minor">
+            <a:schemeClr val="tx1"/>
+          </a:fontRef>
+        </p:style>
+      </p:cxnSp>
+      <p:sp>
+        <p:nvSpPr>
+          <p:cNvPr id="28" name="Oval 27">
+            <a:extLst>
+              <a:ext uri="{FF2B5EF4-FFF2-40B4-BE49-F238E27FC236}">
+                <a16:creationId xmlns:a16="http://schemas.microsoft.com/office/drawing/2014/main" id="{838FACCF-A06E-851D-EC8A-D8A9EE0D7852}"/>
+              </a:ext>
+            </a:extLst>
+          </p:cNvPr>
+          <p:cNvSpPr/>
+          <p:nvPr/>
+        </p:nvSpPr>
+        <p:spPr>
+          <a:xfrm>
+            <a:off x="7897091" y="4661266"/>
+            <a:ext cx="976871" cy="890081"/>
+          </a:xfrm>
+          <a:prstGeom prst="ellipse">
+            <a:avLst/>
+          </a:prstGeom>
+        </p:spPr>
+        <p:style>
+          <a:lnRef idx="2">
+            <a:schemeClr val="dk1"/>
+          </a:lnRef>
+          <a:fillRef idx="1">
+            <a:schemeClr val="lt1"/>
+          </a:fillRef>
+          <a:effectRef idx="0">
+            <a:schemeClr val="dk1"/>
+          </a:effectRef>
+          <a:fontRef idx="minor">
+            <a:schemeClr val="dk1"/>
+          </a:fontRef>
+        </p:style>
+        <p:txBody>
+          <a:bodyPr rtlCol="0" anchor="ctr"/>
+          <a:lstStyle/>
+          <a:p>
+            <a:pPr algn="ctr"/>
+            <a:endParaRPr lang="en-US"/>
+          </a:p>
+        </p:txBody>
+      </p:sp>
+      <p:cxnSp>
+        <p:nvCxnSpPr>
+          <p:cNvPr id="30" name="Connector: Elbow 29">
+            <a:extLst>
+              <a:ext uri="{FF2B5EF4-FFF2-40B4-BE49-F238E27FC236}">
+                <a16:creationId xmlns:a16="http://schemas.microsoft.com/office/drawing/2014/main" id="{A91F7630-89BF-2F20-FC0E-A28A94873F4C}"/>
+              </a:ext>
+            </a:extLst>
+          </p:cNvPr>
+          <p:cNvCxnSpPr>
+            <a:cxnSpLocks/>
+            <a:endCxn id="28" idx="7"/>
+          </p:cNvCxnSpPr>
+          <p:nvPr/>
+        </p:nvCxnSpPr>
+        <p:spPr>
+          <a:xfrm rot="10800000" flipV="1">
+            <a:off x="8730903" y="4285673"/>
+            <a:ext cx="1872442" cy="505942"/>
+          </a:xfrm>
+          <a:prstGeom prst="bentConnector2">
+            <a:avLst/>
+          </a:prstGeom>
+          <a:ln>
+            <a:tailEnd type="triangle"/>
+          </a:ln>
+        </p:spPr>
+        <p:style>
+          <a:lnRef idx="1">
+            <a:schemeClr val="accent1"/>
+          </a:lnRef>
+          <a:fillRef idx="0">
+            <a:schemeClr val="accent1"/>
+          </a:fillRef>
+          <a:effectRef idx="0">
+            <a:schemeClr val="accent1"/>
+          </a:effectRef>
+          <a:fontRef idx="minor">
+            <a:schemeClr val="tx1"/>
+          </a:fontRef>
+        </p:style>
+      </p:cxnSp>
+      <p:cxnSp>
+        <p:nvCxnSpPr>
+          <p:cNvPr id="31" name="Connector: Elbow 30">
+            <a:extLst>
+              <a:ext uri="{FF2B5EF4-FFF2-40B4-BE49-F238E27FC236}">
+                <a16:creationId xmlns:a16="http://schemas.microsoft.com/office/drawing/2014/main" id="{4DBB13C3-2CC3-49E9-8E6A-2E105D9B9D9F}"/>
+              </a:ext>
+            </a:extLst>
+          </p:cNvPr>
+          <p:cNvCxnSpPr>
+            <a:cxnSpLocks/>
+            <a:stCxn id="28" idx="5"/>
+          </p:cNvCxnSpPr>
+          <p:nvPr/>
+        </p:nvCxnSpPr>
+        <p:spPr>
+          <a:xfrm rot="16200000" flipH="1">
+            <a:off x="9361951" y="4789950"/>
+            <a:ext cx="1266129" cy="2528224"/>
+          </a:xfrm>
+          <a:prstGeom prst="bentConnector2">
+            <a:avLst/>
+          </a:prstGeom>
+          <a:ln>
+            <a:tailEnd type="triangle"/>
+          </a:ln>
+        </p:spPr>
+        <p:style>
+          <a:lnRef idx="1">
+            <a:schemeClr val="accent1"/>
+          </a:lnRef>
+          <a:fillRef idx="0">
+            <a:schemeClr val="accent1"/>
+          </a:fillRef>
+          <a:effectRef idx="0">
+            <a:schemeClr val="accent1"/>
+          </a:effectRef>
+          <a:fontRef idx="minor">
+            <a:schemeClr val="tx1"/>
+          </a:fontRef>
+        </p:style>
+      </p:cxnSp>
+      <p:cxnSp>
+        <p:nvCxnSpPr>
+          <p:cNvPr id="34" name="Connector: Elbow 33">
+            <a:extLst>
+              <a:ext uri="{FF2B5EF4-FFF2-40B4-BE49-F238E27FC236}">
+                <a16:creationId xmlns:a16="http://schemas.microsoft.com/office/drawing/2014/main" id="{021BE139-14CE-CE40-67AD-1924E86F0E32}"/>
+              </a:ext>
+            </a:extLst>
+          </p:cNvPr>
+          <p:cNvCxnSpPr>
+            <a:cxnSpLocks/>
+            <a:endCxn id="28" idx="1"/>
+          </p:cNvCxnSpPr>
+          <p:nvPr/>
+        </p:nvCxnSpPr>
+        <p:spPr>
+          <a:xfrm>
+            <a:off x="6576291" y="3731491"/>
+            <a:ext cx="1463859" cy="1060124"/>
+          </a:xfrm>
+          <a:prstGeom prst="bentConnector2">
+            <a:avLst/>
+          </a:prstGeom>
+          <a:ln>
+            <a:tailEnd type="triangle"/>
+          </a:ln>
+        </p:spPr>
+        <p:style>
+          <a:lnRef idx="1">
+            <a:schemeClr val="accent1"/>
+          </a:lnRef>
+          <a:fillRef idx="0">
+            <a:schemeClr val="accent1"/>
+          </a:fillRef>
+          <a:effectRef idx="0">
+            <a:schemeClr val="accent1"/>
+          </a:effectRef>
+          <a:fontRef idx="minor">
+            <a:schemeClr val="tx1"/>
+          </a:fontRef>
+        </p:style>
+      </p:cxnSp>
+      <p:cxnSp>
+        <p:nvCxnSpPr>
+          <p:cNvPr id="37" name="Connector: Elbow 36">
+            <a:extLst>
+              <a:ext uri="{FF2B5EF4-FFF2-40B4-BE49-F238E27FC236}">
+                <a16:creationId xmlns:a16="http://schemas.microsoft.com/office/drawing/2014/main" id="{F4630FD9-13B6-7856-1DD0-24859DCCF346}"/>
+              </a:ext>
+            </a:extLst>
+          </p:cNvPr>
+          <p:cNvCxnSpPr>
+            <a:cxnSpLocks/>
+            <a:stCxn id="28" idx="3"/>
+          </p:cNvCxnSpPr>
+          <p:nvPr/>
+        </p:nvCxnSpPr>
+        <p:spPr>
+          <a:xfrm rot="5400000">
+            <a:off x="7197011" y="4948061"/>
+            <a:ext cx="370202" cy="1316077"/>
           </a:xfrm>
           <a:prstGeom prst="bentConnector2">
             <a:avLst/>

</xml_diff>